<commit_message>
Fixed bug in geometry where diving board was being cut off. Added drawings/rotaryCentering.pptx to describe a proposed rotary scan
</commit_message>
<xml_diff>
--- a/drawings/toScale_clearances_oppi.pptx
+++ b/drawings/toScale_clearances_oppi.pptx
@@ -266,7 +266,7 @@
           <a:p>
             <a:fld id="{2C84D9F7-B586-E941-91F6-AA387EEC8C39}" type="datetimeFigureOut">
               <a:rPr lang="en-US" smtClean="0"/>
-              <a:t>10/6/20</a:t>
+              <a:t>3/8/21</a:t>
             </a:fld>
             <a:endParaRPr lang="en-US"/>
           </a:p>
@@ -436,7 +436,7 @@
           <a:p>
             <a:fld id="{2C84D9F7-B586-E941-91F6-AA387EEC8C39}" type="datetimeFigureOut">
               <a:rPr lang="en-US" smtClean="0"/>
-              <a:t>10/6/20</a:t>
+              <a:t>3/8/21</a:t>
             </a:fld>
             <a:endParaRPr lang="en-US"/>
           </a:p>
@@ -616,7 +616,7 @@
           <a:p>
             <a:fld id="{2C84D9F7-B586-E941-91F6-AA387EEC8C39}" type="datetimeFigureOut">
               <a:rPr lang="en-US" smtClean="0"/>
-              <a:t>10/6/20</a:t>
+              <a:t>3/8/21</a:t>
             </a:fld>
             <a:endParaRPr lang="en-US"/>
           </a:p>
@@ -786,7 +786,7 @@
           <a:p>
             <a:fld id="{2C84D9F7-B586-E941-91F6-AA387EEC8C39}" type="datetimeFigureOut">
               <a:rPr lang="en-US" smtClean="0"/>
-              <a:t>10/6/20</a:t>
+              <a:t>3/8/21</a:t>
             </a:fld>
             <a:endParaRPr lang="en-US"/>
           </a:p>
@@ -1030,7 +1030,7 @@
           <a:p>
             <a:fld id="{2C84D9F7-B586-E941-91F6-AA387EEC8C39}" type="datetimeFigureOut">
               <a:rPr lang="en-US" smtClean="0"/>
-              <a:t>10/6/20</a:t>
+              <a:t>3/8/21</a:t>
             </a:fld>
             <a:endParaRPr lang="en-US"/>
           </a:p>
@@ -1262,7 +1262,7 @@
           <a:p>
             <a:fld id="{2C84D9F7-B586-E941-91F6-AA387EEC8C39}" type="datetimeFigureOut">
               <a:rPr lang="en-US" smtClean="0"/>
-              <a:t>10/6/20</a:t>
+              <a:t>3/8/21</a:t>
             </a:fld>
             <a:endParaRPr lang="en-US"/>
           </a:p>
@@ -1629,7 +1629,7 @@
           <a:p>
             <a:fld id="{2C84D9F7-B586-E941-91F6-AA387EEC8C39}" type="datetimeFigureOut">
               <a:rPr lang="en-US" smtClean="0"/>
-              <a:t>10/6/20</a:t>
+              <a:t>3/8/21</a:t>
             </a:fld>
             <a:endParaRPr lang="en-US"/>
           </a:p>
@@ -1747,7 +1747,7 @@
           <a:p>
             <a:fld id="{2C84D9F7-B586-E941-91F6-AA387EEC8C39}" type="datetimeFigureOut">
               <a:rPr lang="en-US" smtClean="0"/>
-              <a:t>10/6/20</a:t>
+              <a:t>3/8/21</a:t>
             </a:fld>
             <a:endParaRPr lang="en-US"/>
           </a:p>
@@ -1842,7 +1842,7 @@
           <a:p>
             <a:fld id="{2C84D9F7-B586-E941-91F6-AA387EEC8C39}" type="datetimeFigureOut">
               <a:rPr lang="en-US" smtClean="0"/>
-              <a:t>10/6/20</a:t>
+              <a:t>3/8/21</a:t>
             </a:fld>
             <a:endParaRPr lang="en-US"/>
           </a:p>
@@ -2119,7 +2119,7 @@
           <a:p>
             <a:fld id="{2C84D9F7-B586-E941-91F6-AA387EEC8C39}" type="datetimeFigureOut">
               <a:rPr lang="en-US" smtClean="0"/>
-              <a:t>10/6/20</a:t>
+              <a:t>3/8/21</a:t>
             </a:fld>
             <a:endParaRPr lang="en-US"/>
           </a:p>
@@ -2376,7 +2376,7 @@
           <a:p>
             <a:fld id="{2C84D9F7-B586-E941-91F6-AA387EEC8C39}" type="datetimeFigureOut">
               <a:rPr lang="en-US" smtClean="0"/>
-              <a:t>10/6/20</a:t>
+              <a:t>3/8/21</a:t>
             </a:fld>
             <a:endParaRPr lang="en-US"/>
           </a:p>
@@ -2589,7 +2589,7 @@
           <a:p>
             <a:fld id="{2C84D9F7-B586-E941-91F6-AA387EEC8C39}" type="datetimeFigureOut">
               <a:rPr lang="en-US" smtClean="0"/>
-              <a:t>10/6/20</a:t>
+              <a:t>3/8/21</a:t>
             </a:fld>
             <a:endParaRPr lang="en-US"/>
           </a:p>
@@ -3384,7 +3384,7 @@
           <a:p>
             <a:r>
               <a:rPr lang="en-US" sz="3200" dirty="0"/>
-              <a:t>6 mm </a:t>
+              <a:t>6.5 mm </a:t>
             </a:r>
           </a:p>
         </p:txBody>
@@ -6340,7 +6340,7 @@
           <a:p>
             <a:r>
               <a:rPr lang="en-US" sz="3200" dirty="0"/>
-              <a:t>6 mm </a:t>
+              <a:t>6.5 mm </a:t>
             </a:r>
           </a:p>
         </p:txBody>
@@ -8398,8 +8398,8 @@
           </a:p>
         </p:txBody>
       </p:sp>
-      <mc:AlternateContent xmlns:mc="http://schemas.openxmlformats.org/markup-compatibility/2006">
-        <mc:Choice xmlns:a14="http://schemas.microsoft.com/office/drawing/2010/main" Requires="a14">
+      <mc:AlternateContent xmlns:mc="http://schemas.openxmlformats.org/markup-compatibility/2006" xmlns:a14="http://schemas.microsoft.com/office/drawing/2010/main">
+        <mc:Choice Requires="a14">
           <p:sp>
             <p:nvSpPr>
               <p:cNvPr id="72" name="TextBox 71">
@@ -8428,6 +8428,7 @@
               </a:bodyPr>
               <a:lstStyle/>
               <a:p>
+                <a:pPr/>
                 <a14:m>
                   <m:oMath xmlns:m="http://schemas.openxmlformats.org/officeDocument/2006/math">
                     <m:sSub>
@@ -8539,7 +8540,7 @@
             </p:txBody>
           </p:sp>
         </mc:Choice>
-        <mc:Fallback>
+        <mc:Fallback xmlns="">
           <p:sp>
             <p:nvSpPr>
               <p:cNvPr id="72" name="TextBox 71">
@@ -11942,8 +11943,8 @@
           </a:fontRef>
         </p:style>
       </p:cxnSp>
-      <mc:AlternateContent xmlns:mc="http://schemas.openxmlformats.org/markup-compatibility/2006">
-        <mc:Choice xmlns:a14="http://schemas.microsoft.com/office/drawing/2010/main" Requires="a14">
+      <mc:AlternateContent xmlns:mc="http://schemas.openxmlformats.org/markup-compatibility/2006" xmlns:a14="http://schemas.microsoft.com/office/drawing/2010/main">
+        <mc:Choice Requires="a14">
           <p:sp>
             <p:nvSpPr>
               <p:cNvPr id="90" name="TextBox 89">
@@ -12012,7 +12013,7 @@
             </p:txBody>
           </p:sp>
         </mc:Choice>
-        <mc:Fallback>
+        <mc:Fallback xmlns="">
           <p:sp>
             <p:nvSpPr>
               <p:cNvPr id="90" name="TextBox 89">
@@ -12106,8 +12107,8 @@
           </a:p>
         </p:txBody>
       </p:sp>
-      <mc:AlternateContent xmlns:mc="http://schemas.openxmlformats.org/markup-compatibility/2006">
-        <mc:Choice xmlns:a14="http://schemas.microsoft.com/office/drawing/2010/main" Requires="a14">
+      <mc:AlternateContent xmlns:mc="http://schemas.openxmlformats.org/markup-compatibility/2006" xmlns:a14="http://schemas.microsoft.com/office/drawing/2010/main">
+        <mc:Choice Requires="a14">
           <p:sp>
             <p:nvSpPr>
               <p:cNvPr id="92" name="TextBox 91">
@@ -12176,7 +12177,7 @@
             </p:txBody>
           </p:sp>
         </mc:Choice>
-        <mc:Fallback>
+        <mc:Fallback xmlns="">
           <p:sp>
             <p:nvSpPr>
               <p:cNvPr id="92" name="TextBox 91">
@@ -12270,8 +12271,8 @@
           </a:p>
         </p:txBody>
       </p:sp>
-      <mc:AlternateContent xmlns:mc="http://schemas.openxmlformats.org/markup-compatibility/2006">
-        <mc:Choice xmlns:a14="http://schemas.microsoft.com/office/drawing/2010/main" Requires="a14">
+      <mc:AlternateContent xmlns:mc="http://schemas.openxmlformats.org/markup-compatibility/2006" xmlns:a14="http://schemas.microsoft.com/office/drawing/2010/main">
+        <mc:Choice Requires="a14">
           <p:sp>
             <p:nvSpPr>
               <p:cNvPr id="94" name="TextBox 93">
@@ -12410,7 +12411,7 @@
             </p:txBody>
           </p:sp>
         </mc:Choice>
-        <mc:Fallback>
+        <mc:Fallback xmlns="">
           <p:sp>
             <p:nvSpPr>
               <p:cNvPr id="94" name="TextBox 93">
@@ -12460,8 +12461,8 @@
           </p:sp>
         </mc:Fallback>
       </mc:AlternateContent>
-      <mc:AlternateContent xmlns:mc="http://schemas.openxmlformats.org/markup-compatibility/2006">
-        <mc:Choice xmlns:a14="http://schemas.microsoft.com/office/drawing/2010/main" Requires="a14">
+      <mc:AlternateContent xmlns:mc="http://schemas.openxmlformats.org/markup-compatibility/2006" xmlns:a14="http://schemas.microsoft.com/office/drawing/2010/main">
+        <mc:Choice Requires="a14">
           <p:sp>
             <p:nvSpPr>
               <p:cNvPr id="95" name="TextBox 94">
@@ -12497,6 +12498,7 @@
               </a:bodyPr>
               <a:lstStyle/>
               <a:p>
+                <a:pPr/>
                 <a:r>
                   <a:rPr lang="en-US" sz="4400" dirty="0"/>
                   <a:t>the rotation angle of the source motor is </a:t>
@@ -12566,7 +12568,7 @@
             </p:txBody>
           </p:sp>
         </mc:Choice>
-        <mc:Fallback>
+        <mc:Fallback xmlns="">
           <p:sp>
             <p:nvSpPr>
               <p:cNvPr id="95" name="TextBox 94">
@@ -12709,8 +12711,8 @@
           </a:p>
         </p:txBody>
       </p:sp>
-      <mc:AlternateContent xmlns:mc="http://schemas.openxmlformats.org/markup-compatibility/2006">
-        <mc:Choice xmlns:a14="http://schemas.microsoft.com/office/drawing/2010/main" Requires="a14">
+      <mc:AlternateContent xmlns:mc="http://schemas.openxmlformats.org/markup-compatibility/2006" xmlns:a14="http://schemas.microsoft.com/office/drawing/2010/main">
+        <mc:Choice Requires="a14">
           <p:sp>
             <p:nvSpPr>
               <p:cNvPr id="98" name="Rectangle 97">
@@ -12781,7 +12783,7 @@
             </p:txBody>
           </p:sp>
         </mc:Choice>
-        <mc:Fallback>
+        <mc:Fallback xmlns="">
           <p:sp>
             <p:nvSpPr>
               <p:cNvPr id="98" name="Rectangle 97">
@@ -13157,7 +13159,7 @@
           <a:p>
             <a:r>
               <a:rPr lang="en-US" sz="3200" dirty="0"/>
-              <a:t>6 mm </a:t>
+              <a:t>6.5 mm </a:t>
             </a:r>
           </a:p>
         </p:txBody>
@@ -15087,8 +15089,8 @@
           </a:p>
         </p:txBody>
       </p:sp>
-      <mc:AlternateContent xmlns:mc="http://schemas.openxmlformats.org/markup-compatibility/2006">
-        <mc:Choice xmlns:a14="http://schemas.microsoft.com/office/drawing/2010/main" Requires="a14">
+      <mc:AlternateContent xmlns:mc="http://schemas.openxmlformats.org/markup-compatibility/2006" xmlns:a14="http://schemas.microsoft.com/office/drawing/2010/main">
+        <mc:Choice Requires="a14">
           <p:sp>
             <p:nvSpPr>
               <p:cNvPr id="72" name="TextBox 71">
@@ -15124,6 +15126,7 @@
               </a:bodyPr>
               <a:lstStyle/>
               <a:p>
+                <a:pPr/>
                 <a:r>
                   <a:rPr lang="en-US" sz="4400" dirty="0"/>
                   <a:t>the rotation angle of the source motor is </a:t>
@@ -15193,7 +15196,7 @@
             </p:txBody>
           </p:sp>
         </mc:Choice>
-        <mc:Fallback>
+        <mc:Fallback xmlns="">
           <p:sp>
             <p:nvSpPr>
               <p:cNvPr id="72" name="TextBox 71">
@@ -15609,8 +15612,8 @@
           </a:p>
         </p:txBody>
       </p:sp>
-      <mc:AlternateContent xmlns:mc="http://schemas.openxmlformats.org/markup-compatibility/2006">
-        <mc:Choice xmlns:a14="http://schemas.microsoft.com/office/drawing/2010/main" Requires="a14">
+      <mc:AlternateContent xmlns:mc="http://schemas.openxmlformats.org/markup-compatibility/2006" xmlns:a14="http://schemas.microsoft.com/office/drawing/2010/main">
+        <mc:Choice Requires="a14">
           <p:sp>
             <p:nvSpPr>
               <p:cNvPr id="94" name="TextBox 93">
@@ -15706,7 +15709,7 @@
             </p:txBody>
           </p:sp>
         </mc:Choice>
-        <mc:Fallback>
+        <mc:Fallback xmlns="">
           <p:sp>
             <p:nvSpPr>
               <p:cNvPr id="94" name="TextBox 93">
@@ -15971,8 +15974,8 @@
           </a:p>
         </p:txBody>
       </p:sp>
-      <mc:AlternateContent xmlns:mc="http://schemas.openxmlformats.org/markup-compatibility/2006">
-        <mc:Choice xmlns:a14="http://schemas.microsoft.com/office/drawing/2010/main" Requires="a14">
+      <mc:AlternateContent xmlns:mc="http://schemas.openxmlformats.org/markup-compatibility/2006" xmlns:a14="http://schemas.microsoft.com/office/drawing/2010/main">
+        <mc:Choice Requires="a14">
           <p:sp>
             <p:nvSpPr>
               <p:cNvPr id="19" name="Rectangle 18">
@@ -16043,7 +16046,7 @@
             </p:txBody>
           </p:sp>
         </mc:Choice>
-        <mc:Fallback>
+        <mc:Fallback xmlns="">
           <p:sp>
             <p:nvSpPr>
               <p:cNvPr id="19" name="Rectangle 18">
@@ -16419,7 +16422,7 @@
           <a:p>
             <a:r>
               <a:rPr lang="en-US" sz="3200" dirty="0"/>
-              <a:t>6 mm </a:t>
+              <a:t>6.5 mm </a:t>
             </a:r>
           </a:p>
         </p:txBody>
@@ -18633,8 +18636,8 @@
           </a:p>
         </p:txBody>
       </p:sp>
-      <mc:AlternateContent xmlns:mc="http://schemas.openxmlformats.org/markup-compatibility/2006">
-        <mc:Choice xmlns:a14="http://schemas.microsoft.com/office/drawing/2010/main" Requires="a14">
+      <mc:AlternateContent xmlns:mc="http://schemas.openxmlformats.org/markup-compatibility/2006" xmlns:a14="http://schemas.microsoft.com/office/drawing/2010/main">
+        <mc:Choice Requires="a14">
           <p:sp>
             <p:nvSpPr>
               <p:cNvPr id="94" name="TextBox 93">
@@ -18767,7 +18770,7 @@
             </p:txBody>
           </p:sp>
         </mc:Choice>
-        <mc:Fallback>
+        <mc:Fallback xmlns="">
           <p:sp>
             <p:nvSpPr>
               <p:cNvPr id="94" name="TextBox 93">
@@ -18894,8 +18897,8 @@
           </a:p>
         </p:txBody>
       </p:sp>
-      <mc:AlternateContent xmlns:mc="http://schemas.openxmlformats.org/markup-compatibility/2006">
-        <mc:Choice xmlns:a14="http://schemas.microsoft.com/office/drawing/2010/main" Requires="a14">
+      <mc:AlternateContent xmlns:mc="http://schemas.openxmlformats.org/markup-compatibility/2006" xmlns:a14="http://schemas.microsoft.com/office/drawing/2010/main">
+        <mc:Choice Requires="a14">
           <p:sp>
             <p:nvSpPr>
               <p:cNvPr id="96" name="TextBox 95">
@@ -18931,6 +18934,7 @@
               </a:bodyPr>
               <a:lstStyle/>
               <a:p>
+                <a:pPr/>
                 <a:r>
                   <a:rPr lang="en-US" sz="4400" dirty="0"/>
                   <a:t>the rotation angle of the source motor is </a:t>
@@ -19000,7 +19004,7 @@
             </p:txBody>
           </p:sp>
         </mc:Choice>
-        <mc:Fallback>
+        <mc:Fallback xmlns="">
           <p:sp>
             <p:nvSpPr>
               <p:cNvPr id="96" name="TextBox 95">
@@ -19143,8 +19147,8 @@
           </a:p>
         </p:txBody>
       </p:sp>
-      <mc:AlternateContent xmlns:mc="http://schemas.openxmlformats.org/markup-compatibility/2006">
-        <mc:Choice xmlns:a14="http://schemas.microsoft.com/office/drawing/2010/main" Requires="a14">
+      <mc:AlternateContent xmlns:mc="http://schemas.openxmlformats.org/markup-compatibility/2006" xmlns:a14="http://schemas.microsoft.com/office/drawing/2010/main">
+        <mc:Choice Requires="a14">
           <p:sp>
             <p:nvSpPr>
               <p:cNvPr id="99" name="Rectangle 98">
@@ -19215,7 +19219,7 @@
             </p:txBody>
           </p:sp>
         </mc:Choice>
-        <mc:Fallback>
+        <mc:Fallback xmlns="">
           <p:sp>
             <p:nvSpPr>
               <p:cNvPr id="99" name="Rectangle 98">
@@ -19591,7 +19595,7 @@
           <a:p>
             <a:r>
               <a:rPr lang="en-US" sz="3200" dirty="0"/>
-              <a:t>6 mm </a:t>
+              <a:t>6.5 mm </a:t>
             </a:r>
           </a:p>
         </p:txBody>
@@ -21974,8 +21978,8 @@
           </a:fontRef>
         </p:style>
       </p:cxnSp>
-      <mc:AlternateContent xmlns:mc="http://schemas.openxmlformats.org/markup-compatibility/2006">
-        <mc:Choice xmlns:a14="http://schemas.microsoft.com/office/drawing/2010/main" Requires="a14">
+      <mc:AlternateContent xmlns:mc="http://schemas.openxmlformats.org/markup-compatibility/2006" xmlns:a14="http://schemas.microsoft.com/office/drawing/2010/main">
+        <mc:Choice Requires="a14">
           <p:sp>
             <p:nvSpPr>
               <p:cNvPr id="90" name="TextBox 89">
@@ -22044,7 +22048,7 @@
             </p:txBody>
           </p:sp>
         </mc:Choice>
-        <mc:Fallback>
+        <mc:Fallback xmlns="">
           <p:sp>
             <p:nvSpPr>
               <p:cNvPr id="90" name="TextBox 89">
@@ -22138,8 +22142,8 @@
           </a:p>
         </p:txBody>
       </p:sp>
-      <mc:AlternateContent xmlns:mc="http://schemas.openxmlformats.org/markup-compatibility/2006">
-        <mc:Choice xmlns:a14="http://schemas.microsoft.com/office/drawing/2010/main" Requires="a14">
+      <mc:AlternateContent xmlns:mc="http://schemas.openxmlformats.org/markup-compatibility/2006" xmlns:a14="http://schemas.microsoft.com/office/drawing/2010/main">
+        <mc:Choice Requires="a14">
           <p:sp>
             <p:nvSpPr>
               <p:cNvPr id="92" name="TextBox 91">
@@ -22208,7 +22212,7 @@
             </p:txBody>
           </p:sp>
         </mc:Choice>
-        <mc:Fallback>
+        <mc:Fallback xmlns="">
           <p:sp>
             <p:nvSpPr>
               <p:cNvPr id="92" name="TextBox 91">
@@ -22302,8 +22306,8 @@
           </a:p>
         </p:txBody>
       </p:sp>
-      <mc:AlternateContent xmlns:mc="http://schemas.openxmlformats.org/markup-compatibility/2006">
-        <mc:Choice xmlns:a14="http://schemas.microsoft.com/office/drawing/2010/main" Requires="a14">
+      <mc:AlternateContent xmlns:mc="http://schemas.openxmlformats.org/markup-compatibility/2006" xmlns:a14="http://schemas.microsoft.com/office/drawing/2010/main">
+        <mc:Choice Requires="a14">
           <p:sp>
             <p:nvSpPr>
               <p:cNvPr id="94" name="TextBox 93">
@@ -22451,7 +22455,7 @@
             </p:txBody>
           </p:sp>
         </mc:Choice>
-        <mc:Fallback>
+        <mc:Fallback xmlns="">
           <p:sp>
             <p:nvSpPr>
               <p:cNvPr id="94" name="TextBox 93">
@@ -22501,8 +22505,8 @@
           </p:sp>
         </mc:Fallback>
       </mc:AlternateContent>
-      <mc:AlternateContent xmlns:mc="http://schemas.openxmlformats.org/markup-compatibility/2006">
-        <mc:Choice xmlns:a14="http://schemas.microsoft.com/office/drawing/2010/main" Requires="a14">
+      <mc:AlternateContent xmlns:mc="http://schemas.openxmlformats.org/markup-compatibility/2006" xmlns:a14="http://schemas.microsoft.com/office/drawing/2010/main">
+        <mc:Choice Requires="a14">
           <p:sp>
             <p:nvSpPr>
               <p:cNvPr id="83" name="TextBox 82">
@@ -22538,6 +22542,7 @@
               </a:bodyPr>
               <a:lstStyle/>
               <a:p>
+                <a:pPr/>
                 <a:r>
                   <a:rPr lang="en-US" sz="4400" dirty="0"/>
                   <a:t>the rotation angle of the source motor is </a:t>
@@ -22607,7 +22612,7 @@
             </p:txBody>
           </p:sp>
         </mc:Choice>
-        <mc:Fallback>
+        <mc:Fallback xmlns="">
           <p:sp>
             <p:nvSpPr>
               <p:cNvPr id="83" name="TextBox 82">
@@ -22750,8 +22755,8 @@
           </a:p>
         </p:txBody>
       </p:sp>
-      <mc:AlternateContent xmlns:mc="http://schemas.openxmlformats.org/markup-compatibility/2006">
-        <mc:Choice xmlns:a14="http://schemas.microsoft.com/office/drawing/2010/main" Requires="a14">
+      <mc:AlternateContent xmlns:mc="http://schemas.openxmlformats.org/markup-compatibility/2006" xmlns:a14="http://schemas.microsoft.com/office/drawing/2010/main">
+        <mc:Choice Requires="a14">
           <p:sp>
             <p:nvSpPr>
               <p:cNvPr id="95" name="Rectangle 94">
@@ -22822,7 +22827,7 @@
             </p:txBody>
           </p:sp>
         </mc:Choice>
-        <mc:Fallback>
+        <mc:Fallback xmlns="">
           <p:sp>
             <p:nvSpPr>
               <p:cNvPr id="95" name="Rectangle 94">
@@ -23287,7 +23292,7 @@
           <a:p>
             <a:r>
               <a:rPr lang="en-US" sz="3200" dirty="0"/>
-              <a:t>6 mm </a:t>
+              <a:t>6.5 mm </a:t>
             </a:r>
           </a:p>
         </p:txBody>
@@ -25782,8 +25787,8 @@
           </a:p>
         </p:txBody>
       </p:sp>
-      <mc:AlternateContent xmlns:mc="http://schemas.openxmlformats.org/markup-compatibility/2006">
-        <mc:Choice xmlns:a14="http://schemas.microsoft.com/office/drawing/2010/main" Requires="a14">
+      <mc:AlternateContent xmlns:mc="http://schemas.openxmlformats.org/markup-compatibility/2006" xmlns:a14="http://schemas.microsoft.com/office/drawing/2010/main">
+        <mc:Choice Requires="a14">
           <p:sp>
             <p:nvSpPr>
               <p:cNvPr id="86" name="TextBox 85">
@@ -25931,7 +25936,7 @@
             </p:txBody>
           </p:sp>
         </mc:Choice>
-        <mc:Fallback>
+        <mc:Fallback xmlns="">
           <p:sp>
             <p:nvSpPr>
               <p:cNvPr id="86" name="TextBox 85">
@@ -25981,8 +25986,8 @@
           </p:sp>
         </mc:Fallback>
       </mc:AlternateContent>
-      <mc:AlternateContent xmlns:mc="http://schemas.openxmlformats.org/markup-compatibility/2006">
-        <mc:Choice xmlns:a14="http://schemas.microsoft.com/office/drawing/2010/main" Requires="a14">
+      <mc:AlternateContent xmlns:mc="http://schemas.openxmlformats.org/markup-compatibility/2006" xmlns:a14="http://schemas.microsoft.com/office/drawing/2010/main">
+        <mc:Choice Requires="a14">
           <p:sp>
             <p:nvSpPr>
               <p:cNvPr id="87" name="TextBox 86">
@@ -26018,6 +26023,7 @@
               </a:bodyPr>
               <a:lstStyle/>
               <a:p>
+                <a:pPr/>
                 <a:r>
                   <a:rPr lang="en-US" sz="4400" dirty="0"/>
                   <a:t>the rotation angle of the source motor is </a:t>
@@ -26087,7 +26093,7 @@
             </p:txBody>
           </p:sp>
         </mc:Choice>
-        <mc:Fallback>
+        <mc:Fallback xmlns="">
           <p:sp>
             <p:nvSpPr>
               <p:cNvPr id="87" name="TextBox 86">
@@ -26230,8 +26236,8 @@
           </a:p>
         </p:txBody>
       </p:sp>
-      <mc:AlternateContent xmlns:mc="http://schemas.openxmlformats.org/markup-compatibility/2006">
-        <mc:Choice xmlns:a14="http://schemas.microsoft.com/office/drawing/2010/main" Requires="a14">
+      <mc:AlternateContent xmlns:mc="http://schemas.openxmlformats.org/markup-compatibility/2006" xmlns:a14="http://schemas.microsoft.com/office/drawing/2010/main">
+        <mc:Choice Requires="a14">
           <p:sp>
             <p:nvSpPr>
               <p:cNvPr id="90" name="Rectangle 89">
@@ -26302,7 +26308,7 @@
             </p:txBody>
           </p:sp>
         </mc:Choice>
-        <mc:Fallback>
+        <mc:Fallback xmlns="">
           <p:sp>
             <p:nvSpPr>
               <p:cNvPr id="90" name="Rectangle 89">
@@ -26766,8 +26772,12 @@
           <a:lstStyle/>
           <a:p>
             <a:r>
+              <a:rPr lang="en-US" sz="3200"/>
+              <a:t>6.5 </a:t>
+            </a:r>
+            <a:r>
               <a:rPr lang="en-US" sz="3200" dirty="0"/>
-              <a:t>6 mm </a:t>
+              <a:t>mm </a:t>
             </a:r>
           </a:p>
         </p:txBody>
@@ -29262,8 +29272,8 @@
           </a:p>
         </p:txBody>
       </p:sp>
-      <mc:AlternateContent xmlns:mc="http://schemas.openxmlformats.org/markup-compatibility/2006">
-        <mc:Choice xmlns:a14="http://schemas.microsoft.com/office/drawing/2010/main" Requires="a14">
+      <mc:AlternateContent xmlns:mc="http://schemas.openxmlformats.org/markup-compatibility/2006" xmlns:a14="http://schemas.microsoft.com/office/drawing/2010/main">
+        <mc:Choice Requires="a14">
           <p:sp>
             <p:nvSpPr>
               <p:cNvPr id="86" name="TextBox 85">
@@ -29299,6 +29309,7 @@
               </a:bodyPr>
               <a:lstStyle/>
               <a:p>
+                <a:pPr/>
                 <a:r>
                   <a:rPr lang="en-US" sz="4400" dirty="0"/>
                   <a:t>the rotation angle of the source motor is </a:t>
@@ -29368,7 +29379,7 @@
             </p:txBody>
           </p:sp>
         </mc:Choice>
-        <mc:Fallback>
+        <mc:Fallback xmlns="">
           <p:sp>
             <p:nvSpPr>
               <p:cNvPr id="86" name="TextBox 85">
@@ -29511,8 +29522,8 @@
           </a:p>
         </p:txBody>
       </p:sp>
-      <mc:AlternateContent xmlns:mc="http://schemas.openxmlformats.org/markup-compatibility/2006">
-        <mc:Choice xmlns:a14="http://schemas.microsoft.com/office/drawing/2010/main" Requires="a14">
+      <mc:AlternateContent xmlns:mc="http://schemas.openxmlformats.org/markup-compatibility/2006" xmlns:a14="http://schemas.microsoft.com/office/drawing/2010/main">
+        <mc:Choice Requires="a14">
           <p:sp>
             <p:nvSpPr>
               <p:cNvPr id="89" name="Rectangle 88">
@@ -29583,7 +29594,7 @@
             </p:txBody>
           </p:sp>
         </mc:Choice>
-        <mc:Fallback>
+        <mc:Fallback xmlns="">
           <p:sp>
             <p:nvSpPr>
               <p:cNvPr id="89" name="Rectangle 88">
@@ -29628,8 +29639,8 @@
           </p:sp>
         </mc:Fallback>
       </mc:AlternateContent>
-      <mc:AlternateContent xmlns:mc="http://schemas.openxmlformats.org/markup-compatibility/2006">
-        <mc:Choice xmlns:a14="http://schemas.microsoft.com/office/drawing/2010/main" Requires="a14">
+      <mc:AlternateContent xmlns:mc="http://schemas.openxmlformats.org/markup-compatibility/2006" xmlns:a14="http://schemas.microsoft.com/office/drawing/2010/main">
+        <mc:Choice Requires="a14">
           <p:sp>
             <p:nvSpPr>
               <p:cNvPr id="90" name="TextBox 89">
@@ -29777,7 +29788,7 @@
             </p:txBody>
           </p:sp>
         </mc:Choice>
-        <mc:Fallback>
+        <mc:Fallback xmlns="">
           <p:sp>
             <p:nvSpPr>
               <p:cNvPr id="90" name="TextBox 89">

</xml_diff>